<commit_message>
Add initial implementation of airline customer satisfaction analysis
</commit_message>
<xml_diff>
--- a/Final_Project_Airline_Customer_Satisfaction.pptx
+++ b/Final_Project_Airline_Customer_Satisfaction.pptx
@@ -23,6 +23,9 @@
     <p:sldId id="275" r:id="rId16"/>
     <p:sldId id="276" r:id="rId17"/>
     <p:sldId id="277" r:id="rId18"/>
+    <p:sldId id="279" r:id="rId19"/>
+    <p:sldId id="280" r:id="rId20"/>
+    <p:sldId id="278" r:id="rId21"/>
   </p:sldIdLst>
   <p:sldSz cx="12192000" cy="6858000"/>
   <p:notesSz cx="6858000" cy="9144000"/>
@@ -5735,8 +5738,8 @@
         </p:blipFill>
         <p:spPr>
           <a:xfrm>
-            <a:off x="8662670" y="149225"/>
-            <a:ext cx="3237230" cy="2985770"/>
+            <a:off x="9602470" y="149225"/>
+            <a:ext cx="2297430" cy="2250440"/>
           </a:xfrm>
           <a:prstGeom prst="rect">
             <a:avLst/>
@@ -5855,8 +5858,8 @@
         </p:nvSpPr>
         <p:spPr>
           <a:xfrm>
-            <a:off x="127000" y="1836420"/>
-            <a:ext cx="9359900" cy="1396365"/>
+            <a:off x="127000" y="1217295"/>
+            <a:ext cx="9359900" cy="1182370"/>
           </a:xfrm>
           <a:prstGeom prst="rect">
             <a:avLst/>
@@ -5869,21 +5872,1460 @@
           </a:bodyPr>
           <a:p>
             <a:r>
-              <a:rPr lang="en-US" sz="2500" b="1">
+              <a:rPr lang="en-US" sz="2000">
+                <a:solidFill>
+                  <a:schemeClr val="accent2">
+                    <a:lumMod val="50000"/>
+                  </a:schemeClr>
+                </a:solidFill>
+              </a:rPr>
+              <a:t>Airlines should prioritize improvements </a:t>
+            </a:r>
+            <a:r>
+              <a:rPr lang="en-US" sz="2000" b="1" i="1">
+                <a:solidFill>
+                  <a:schemeClr val="accent2">
+                    <a:lumMod val="50000"/>
+                  </a:schemeClr>
+                </a:solidFill>
+              </a:rPr>
+              <a:t>inflight entertainment</a:t>
+            </a:r>
+            <a:r>
+              <a:rPr lang="en-US" sz="2000">
+                <a:solidFill>
+                  <a:schemeClr val="accent2">
+                    <a:lumMod val="50000"/>
+                  </a:schemeClr>
+                </a:solidFill>
+              </a:rPr>
+              <a:t>, </a:t>
+            </a:r>
+            <a:endParaRPr lang="en-US" sz="2000">
+              <a:solidFill>
+                <a:schemeClr val="accent2">
+                  <a:lumMod val="50000"/>
+                </a:schemeClr>
+              </a:solidFill>
+            </a:endParaRPr>
+          </a:p>
+          <a:p>
+            <a:r>
+              <a:rPr lang="en-US" sz="2000" b="1" i="1">
+                <a:solidFill>
+                  <a:schemeClr val="accent2">
+                    <a:lumMod val="50000"/>
+                  </a:schemeClr>
+                </a:solidFill>
+              </a:rPr>
+              <a:t>on-board service</a:t>
+            </a:r>
+            <a:r>
+              <a:rPr lang="en-US" sz="2000">
+                <a:solidFill>
+                  <a:schemeClr val="accent2">
+                    <a:lumMod val="50000"/>
+                  </a:schemeClr>
+                </a:solidFill>
+              </a:rPr>
+              <a:t>, and </a:t>
+            </a:r>
+            <a:r>
+              <a:rPr lang="en-US" sz="2000" b="1" i="1">
+                <a:solidFill>
+                  <a:schemeClr val="accent2">
+                    <a:lumMod val="50000"/>
+                  </a:schemeClr>
+                </a:solidFill>
+              </a:rPr>
+              <a:t>seat co</a:t>
+            </a:r>
+            <a:r>
+              <a:rPr lang="vi-VN" altLang="en-US" sz="2000" b="1" i="1">
+                <a:solidFill>
+                  <a:schemeClr val="accent2">
+                    <a:lumMod val="50000"/>
+                  </a:schemeClr>
+                </a:solidFill>
+              </a:rPr>
+              <a:t>m</a:t>
+            </a:r>
+            <a:r>
+              <a:rPr lang="en-US" sz="2000" b="1" i="1">
+                <a:solidFill>
+                  <a:schemeClr val="accent2">
+                    <a:lumMod val="50000"/>
+                  </a:schemeClr>
+                </a:solidFill>
+              </a:rPr>
+              <a:t>fort</a:t>
+            </a:r>
+            <a:r>
+              <a:rPr lang="en-US" sz="2000">
+                <a:solidFill>
+                  <a:schemeClr val="accent2">
+                    <a:lumMod val="50000"/>
+                  </a:schemeClr>
+                </a:solidFill>
+              </a:rPr>
+              <a:t> to enhance customer satisfaction and reduce dissatisfaction</a:t>
+            </a:r>
+            <a:endParaRPr lang="en-US" sz="2000">
+              <a:solidFill>
+                <a:schemeClr val="accent2">
+                  <a:lumMod val="50000"/>
+                </a:schemeClr>
+              </a:solidFill>
+            </a:endParaRPr>
+          </a:p>
+        </p:txBody>
+      </p:sp>
+      <p:sp>
+        <p:nvSpPr>
+          <p:cNvPr id="2" name="Text Box 1"/>
+          <p:cNvSpPr txBox="1"/>
+          <p:nvPr/>
+        </p:nvSpPr>
+        <p:spPr>
+          <a:xfrm>
+            <a:off x="419100" y="2315210"/>
+            <a:ext cx="11236960" cy="3940810"/>
+          </a:xfrm>
+          <a:prstGeom prst="rect">
+            <a:avLst/>
+          </a:prstGeom>
+          <a:noFill/>
+        </p:spPr>
+        <p:txBody>
+          <a:bodyPr wrap="square" tIns="45720" rtlCol="0" anchor="t">
+            <a:noAutofit/>
+          </a:bodyPr>
+          <a:p>
+            <a:pPr>
+              <a:lnSpc>
+                <a:spcPct val="150000"/>
+              </a:lnSpc>
+            </a:pPr>
+            <a:r>
+              <a:rPr lang="vi-VN" altLang="en-US" sz="2000" b="1">
                 <a:solidFill>
                   <a:srgbClr val="C00000"/>
                 </a:solidFill>
-              </a:rPr>
-              <a:t>Airlines should prioritize improvements inflight entertainment, on-board service, and seat confort to enhance customer satisfaction and reduce dissatisfaction</a:t>
-            </a:r>
-            <a:endParaRPr lang="en-US" sz="2500" b="1">
+                <a:sym typeface="+mn-ea"/>
+              </a:rPr>
+              <a:t>◆ I</a:t>
+            </a:r>
+            <a:r>
+              <a:rPr lang="en-US" sz="2000" b="1">
+                <a:solidFill>
+                  <a:srgbClr val="C00000"/>
+                </a:solidFill>
+                <a:sym typeface="+mn-ea"/>
+              </a:rPr>
+              <a:t>nflight entertainment</a:t>
+            </a:r>
+            <a:r>
+              <a:rPr lang="vi-VN" altLang="en-US" sz="2000" b="1">
+                <a:solidFill>
+                  <a:srgbClr val="C00000"/>
+                </a:solidFill>
+                <a:sym typeface="+mn-ea"/>
+              </a:rPr>
+              <a:t>: </a:t>
+            </a:r>
+            <a:endParaRPr lang="vi-VN" altLang="en-US" sz="2000" b="1">
               <a:solidFill>
                 <a:srgbClr val="C00000"/>
               </a:solidFill>
+              <a:sym typeface="+mn-ea"/>
             </a:endParaRPr>
           </a:p>
-        </p:txBody>
-      </p:sp>
+          <a:p>
+            <a:pPr indent="457200">
+              <a:lnSpc>
+                <a:spcPct val="150000"/>
+              </a:lnSpc>
+            </a:pPr>
+            <a:r>
+              <a:rPr lang="en-US" altLang="en-US" sz="2000" b="1">
+                <a:solidFill>
+                  <a:srgbClr val="C00000"/>
+                </a:solidFill>
+                <a:sym typeface="+mn-ea"/>
+              </a:rPr>
+              <a:t>Movies</a:t>
+            </a:r>
+            <a:r>
+              <a:rPr lang="en-US" altLang="en-US" sz="2000">
+                <a:solidFill>
+                  <a:srgbClr val="C00000"/>
+                </a:solidFill>
+                <a:sym typeface="+mn-ea"/>
+              </a:rPr>
+              <a:t> and </a:t>
+            </a:r>
+            <a:r>
+              <a:rPr lang="en-US" altLang="en-US" sz="2000" b="1">
+                <a:solidFill>
+                  <a:srgbClr val="C00000"/>
+                </a:solidFill>
+                <a:sym typeface="+mn-ea"/>
+              </a:rPr>
+              <a:t>TV Shows</a:t>
+            </a:r>
+            <a:r>
+              <a:rPr lang="en-US" altLang="en-US" sz="2000">
+                <a:solidFill>
+                  <a:srgbClr val="C00000"/>
+                </a:solidFill>
+                <a:sym typeface="+mn-ea"/>
+              </a:rPr>
+              <a:t>: Provide library of the latest movies and TV programs, covering a wide range of genres (action, comedy, documentaries, children's shows, etc.).</a:t>
+            </a:r>
+            <a:endParaRPr lang="en-US" altLang="en-US" sz="2000">
+              <a:solidFill>
+                <a:srgbClr val="C00000"/>
+              </a:solidFill>
+              <a:sym typeface="+mn-ea"/>
+            </a:endParaRPr>
+          </a:p>
+          <a:p>
+            <a:pPr indent="457200">
+              <a:lnSpc>
+                <a:spcPct val="150000"/>
+              </a:lnSpc>
+            </a:pPr>
+            <a:r>
+              <a:rPr lang="en-US" altLang="en-US" sz="2000" b="1">
+                <a:solidFill>
+                  <a:srgbClr val="C00000"/>
+                </a:solidFill>
+                <a:sym typeface="+mn-ea"/>
+              </a:rPr>
+              <a:t>Local Content</a:t>
+            </a:r>
+            <a:r>
+              <a:rPr lang="en-US" altLang="en-US" sz="2000">
+                <a:solidFill>
+                  <a:srgbClr val="C00000"/>
+                </a:solidFill>
+                <a:sym typeface="+mn-ea"/>
+              </a:rPr>
+              <a:t>: Offer content related to the destination or </a:t>
+            </a:r>
+            <a:endParaRPr lang="en-US" altLang="en-US" sz="2000">
+              <a:solidFill>
+                <a:srgbClr val="C00000"/>
+              </a:solidFill>
+              <a:sym typeface="+mn-ea"/>
+            </a:endParaRPr>
+          </a:p>
+          <a:p>
+            <a:pPr>
+              <a:lnSpc>
+                <a:spcPct val="150000"/>
+              </a:lnSpc>
+            </a:pPr>
+            <a:r>
+              <a:rPr lang="en-US" altLang="en-US" sz="2000">
+                <a:solidFill>
+                  <a:srgbClr val="C00000"/>
+                </a:solidFill>
+                <a:sym typeface="+mn-ea"/>
+              </a:rPr>
+              <a:t>local culture for passengers to learn more.</a:t>
+            </a:r>
+            <a:endParaRPr lang="en-US" altLang="en-US" sz="2000">
+              <a:solidFill>
+                <a:srgbClr val="C00000"/>
+              </a:solidFill>
+              <a:sym typeface="+mn-ea"/>
+            </a:endParaRPr>
+          </a:p>
+          <a:p>
+            <a:pPr indent="457200">
+              <a:lnSpc>
+                <a:spcPct val="150000"/>
+              </a:lnSpc>
+            </a:pPr>
+            <a:r>
+              <a:rPr lang="en-US" altLang="en-US" sz="2000">
+                <a:solidFill>
+                  <a:srgbClr val="C00000"/>
+                </a:solidFill>
+                <a:sym typeface="+mn-ea"/>
+              </a:rPr>
+              <a:t>Good Quality </a:t>
+            </a:r>
+            <a:r>
+              <a:rPr lang="en-US" altLang="en-US" sz="2000" b="1">
+                <a:solidFill>
+                  <a:srgbClr val="C00000"/>
+                </a:solidFill>
+                <a:sym typeface="+mn-ea"/>
+              </a:rPr>
+              <a:t>Headphones</a:t>
+            </a:r>
+            <a:r>
+              <a:rPr lang="en-US" altLang="en-US" sz="2000">
+                <a:solidFill>
+                  <a:srgbClr val="C00000"/>
+                </a:solidFill>
+                <a:sym typeface="+mn-ea"/>
+              </a:rPr>
+              <a:t>: Offer headphones with </a:t>
+            </a:r>
+            <a:endParaRPr lang="en-US" altLang="en-US" sz="2000">
+              <a:solidFill>
+                <a:srgbClr val="C00000"/>
+              </a:solidFill>
+              <a:sym typeface="+mn-ea"/>
+            </a:endParaRPr>
+          </a:p>
+          <a:p>
+            <a:pPr>
+              <a:lnSpc>
+                <a:spcPct val="150000"/>
+              </a:lnSpc>
+            </a:pPr>
+            <a:r>
+              <a:rPr lang="en-US" altLang="en-US" sz="2000">
+                <a:solidFill>
+                  <a:srgbClr val="C00000"/>
+                </a:solidFill>
+                <a:sym typeface="+mn-ea"/>
+              </a:rPr>
+              <a:t>good sound quality or encourage passengers to use </a:t>
+            </a:r>
+            <a:endParaRPr lang="en-US" altLang="en-US" sz="2000">
+              <a:solidFill>
+                <a:srgbClr val="C00000"/>
+              </a:solidFill>
+              <a:sym typeface="+mn-ea"/>
+            </a:endParaRPr>
+          </a:p>
+          <a:p>
+            <a:pPr>
+              <a:lnSpc>
+                <a:spcPct val="150000"/>
+              </a:lnSpc>
+            </a:pPr>
+            <a:r>
+              <a:rPr lang="en-US" altLang="en-US" sz="2000">
+                <a:solidFill>
+                  <a:srgbClr val="C00000"/>
+                </a:solidFill>
+                <a:sym typeface="+mn-ea"/>
+              </a:rPr>
+              <a:t>their high-quality personal headphones via common connection ports.</a:t>
+            </a:r>
+            <a:endParaRPr lang="en-US" altLang="en-US" sz="2000">
+              <a:solidFill>
+                <a:srgbClr val="C00000"/>
+              </a:solidFill>
+              <a:sym typeface="+mn-ea"/>
+            </a:endParaRPr>
+          </a:p>
+          <a:p>
+            <a:pPr>
+              <a:lnSpc>
+                <a:spcPct val="150000"/>
+              </a:lnSpc>
+            </a:pPr>
+            <a:endParaRPr lang="en-US" altLang="en-US" sz="2000">
+              <a:solidFill>
+                <a:srgbClr val="C00000"/>
+              </a:solidFill>
+              <a:sym typeface="+mn-ea"/>
+            </a:endParaRPr>
+          </a:p>
+        </p:txBody>
+      </p:sp>
+      <p:pic>
+        <p:nvPicPr>
+          <p:cNvPr id="3" name="Picture 2"/>
+          <p:cNvPicPr/>
+          <p:nvPr/>
+        </p:nvPicPr>
+        <p:blipFill>
+          <a:blip r:embed="rId3">
+            <a:alphaModFix amt="80000"/>
+          </a:blip>
+          <a:stretch>
+            <a:fillRect/>
+          </a:stretch>
+        </p:blipFill>
+        <p:spPr>
+          <a:xfrm>
+            <a:off x="8320405" y="3928745"/>
+            <a:ext cx="3787140" cy="2421255"/>
+          </a:xfrm>
+          <a:prstGeom prst="rect">
+            <a:avLst/>
+          </a:prstGeom>
+          <a:effectLst>
+            <a:softEdge rad="254000"/>
+          </a:effectLst>
+        </p:spPr>
+      </p:pic>
+    </p:spTree>
+  </p:cSld>
+  <p:clrMapOvr>
+    <a:masterClrMapping/>
+  </p:clrMapOvr>
+</p:sld>
+</file>
+
+<file path=ppt/slides/slide16.xml><?xml version="1.0" encoding="utf-8"?>
+<p:sld xmlns:a="http://schemas.openxmlformats.org/drawingml/2006/main" xmlns:r="http://schemas.openxmlformats.org/officeDocument/2006/relationships" xmlns:p="http://schemas.openxmlformats.org/presentationml/2006/main">
+  <p:cSld>
+    <p:bg>
+      <p:bgPr>
+        <a:gradFill>
+          <a:gsLst>
+            <a:gs pos="0">
+              <a:srgbClr val="FEF5D2">
+                <a:lumMod val="70000"/>
+                <a:lumOff val="30000"/>
+              </a:srgbClr>
+            </a:gs>
+            <a:gs pos="100000">
+              <a:srgbClr val="F9D791">
+                <a:lumMod val="65000"/>
+              </a:srgbClr>
+            </a:gs>
+          </a:gsLst>
+          <a:lin ang="2700000" scaled="0"/>
+        </a:gradFill>
+        <a:effectLst/>
+      </p:bgPr>
+    </p:bg>
+    <p:spTree>
+      <p:nvGrpSpPr>
+        <p:cNvPr id="1" name=""/>
+        <p:cNvGrpSpPr/>
+        <p:nvPr/>
+      </p:nvGrpSpPr>
+      <p:grpSpPr/>
+      <p:pic>
+        <p:nvPicPr>
+          <p:cNvPr id="12" name="Picture 11"/>
+          <p:cNvPicPr/>
+          <p:nvPr/>
+        </p:nvPicPr>
+        <p:blipFill>
+          <a:blip r:embed="rId1">
+            <a:alphaModFix amt="10000"/>
+          </a:blip>
+          <a:stretch>
+            <a:fillRect/>
+          </a:stretch>
+        </p:blipFill>
+        <p:spPr>
+          <a:xfrm>
+            <a:off x="0" y="0"/>
+            <a:ext cx="12192000" cy="6858000"/>
+          </a:xfrm>
+          <a:prstGeom prst="rect">
+            <a:avLst/>
+          </a:prstGeom>
+          <a:noFill/>
+          <a:effectLst>
+            <a:glow>
+              <a:schemeClr val="accent1">
+                <a:alpha val="0"/>
+              </a:schemeClr>
+            </a:glow>
+            <a:outerShdw blurRad="50800" dist="50800" dir="5400000" algn="ctr" rotWithShape="0">
+              <a:srgbClr val="000000">
+                <a:alpha val="55000"/>
+              </a:srgbClr>
+            </a:outerShdw>
+            <a:softEdge rad="635000"/>
+          </a:effectLst>
+        </p:spPr>
+      </p:pic>
+      <p:sp>
+        <p:nvSpPr>
+          <p:cNvPr id="5" name="Text Box 4"/>
+          <p:cNvSpPr txBox="1"/>
+          <p:nvPr/>
+        </p:nvSpPr>
+        <p:spPr>
+          <a:xfrm>
+            <a:off x="127000" y="149225"/>
+            <a:ext cx="9359900" cy="629920"/>
+          </a:xfrm>
+          <a:prstGeom prst="rect">
+            <a:avLst/>
+          </a:prstGeom>
+        </p:spPr>
+        <p:txBody>
+          <a:bodyPr wrap="square">
+            <a:spAutoFit/>
+          </a:bodyPr>
+          <a:p>
+            <a:pPr marL="0" indent="0"/>
+            <a:r>
+              <a:rPr sz="3500" b="1" i="0">
+                <a:solidFill>
+                  <a:srgbClr val="002060"/>
+                </a:solidFill>
+                <a:latin typeface="Poppins"/>
+                <a:ea typeface="Poppins"/>
+              </a:rPr>
+              <a:t>Enhancing Airline Customer Experience</a:t>
+            </a:r>
+            <a:endParaRPr sz="3500" b="1" i="0">
+              <a:solidFill>
+                <a:srgbClr val="002060"/>
+              </a:solidFill>
+              <a:latin typeface="Poppins"/>
+              <a:ea typeface="Poppins"/>
+            </a:endParaRPr>
+          </a:p>
+        </p:txBody>
+      </p:sp>
+      <p:sp>
+        <p:nvSpPr>
+          <p:cNvPr id="6" name="Text Box 5"/>
+          <p:cNvSpPr txBox="1"/>
+          <p:nvPr/>
+        </p:nvSpPr>
+        <p:spPr>
+          <a:xfrm>
+            <a:off x="127000" y="778828"/>
+            <a:ext cx="5080000" cy="398780"/>
+          </a:xfrm>
+          <a:prstGeom prst="rect">
+            <a:avLst/>
+          </a:prstGeom>
+        </p:spPr>
+        <p:txBody>
+          <a:bodyPr>
+            <a:spAutoFit/>
+          </a:bodyPr>
+          <a:p>
+            <a:pPr marL="0" indent="0">
+              <a:spcBef>
+                <a:spcPct val="0"/>
+              </a:spcBef>
+              <a:spcAft>
+                <a:spcPct val="0"/>
+              </a:spcAft>
+              <a:buFont typeface="Arial" panose="020B0604020202090204"/>
+              <a:buNone/>
+            </a:pPr>
+            <a:r>
+              <a:rPr lang="en-US" sz="2000" b="0" i="0">
+                <a:solidFill>
+                  <a:schemeClr val="tx1"/>
+                </a:solidFill>
+                <a:latin typeface="Roboto"/>
+                <a:ea typeface="Roboto"/>
+              </a:rPr>
+              <a:t>K</a:t>
+            </a:r>
+            <a:r>
+              <a:rPr sz="2000" b="0" i="0">
+                <a:solidFill>
+                  <a:schemeClr val="tx1"/>
+                </a:solidFill>
+                <a:latin typeface="Roboto"/>
+                <a:ea typeface="Roboto"/>
+              </a:rPr>
+              <a:t>ey Strategies to Boost Satisfaction</a:t>
+            </a:r>
+            <a:endParaRPr sz="2000" b="0" i="0">
+              <a:solidFill>
+                <a:schemeClr val="tx1"/>
+              </a:solidFill>
+              <a:latin typeface="Roboto"/>
+              <a:ea typeface="Roboto"/>
+            </a:endParaRPr>
+          </a:p>
+        </p:txBody>
+      </p:sp>
+      <p:sp>
+        <p:nvSpPr>
+          <p:cNvPr id="9" name="Text Box 8"/>
+          <p:cNvSpPr txBox="1"/>
+          <p:nvPr/>
+        </p:nvSpPr>
+        <p:spPr>
+          <a:xfrm>
+            <a:off x="420624" y="2313432"/>
+            <a:ext cx="9770745" cy="3976370"/>
+          </a:xfrm>
+          <a:prstGeom prst="rect">
+            <a:avLst/>
+          </a:prstGeom>
+          <a:noFill/>
+        </p:spPr>
+        <p:txBody>
+          <a:bodyPr wrap="square" rtlCol="0" anchor="t">
+            <a:noAutofit/>
+          </a:bodyPr>
+          <a:p>
+            <a:r>
+              <a:rPr lang="vi-VN" altLang="en-US" sz="2200" b="1">
+                <a:solidFill>
+                  <a:srgbClr val="C00000"/>
+                </a:solidFill>
+                <a:sym typeface="+mn-ea"/>
+              </a:rPr>
+              <a:t>◆ On-boa</a:t>
+            </a:r>
+            <a:r>
+              <a:rPr lang="vi-VN" altLang="en-US" sz="2200" b="1">
+                <a:solidFill>
+                  <a:srgbClr val="C00000"/>
+                </a:solidFill>
+                <a:sym typeface="+mn-ea"/>
+              </a:rPr>
+              <a:t>rd s</a:t>
+            </a:r>
+            <a:r>
+              <a:rPr lang="vi-VN" altLang="en-US" sz="2200" b="1">
+                <a:solidFill>
+                  <a:srgbClr val="C00000"/>
+                </a:solidFill>
+                <a:sym typeface="+mn-ea"/>
+              </a:rPr>
+              <a:t>ervice:</a:t>
+            </a:r>
+            <a:endParaRPr lang="vi-VN" altLang="en-US" sz="2200" b="1">
+              <a:solidFill>
+                <a:srgbClr val="C00000"/>
+              </a:solidFill>
+              <a:sym typeface="+mn-ea"/>
+            </a:endParaRPr>
+          </a:p>
+          <a:p>
+            <a:pPr indent="457200">
+              <a:lnSpc>
+                <a:spcPct val="150000"/>
+              </a:lnSpc>
+            </a:pPr>
+            <a:endParaRPr lang="en-US" altLang="en-US" sz="2200" b="1">
+              <a:solidFill>
+                <a:srgbClr val="C00000"/>
+              </a:solidFill>
+              <a:sym typeface="+mn-ea"/>
+            </a:endParaRPr>
+          </a:p>
+          <a:p>
+            <a:pPr indent="457200">
+              <a:lnSpc>
+                <a:spcPct val="150000"/>
+              </a:lnSpc>
+            </a:pPr>
+            <a:r>
+              <a:rPr lang="en-US" altLang="en-US" sz="2200" b="1">
+                <a:solidFill>
+                  <a:srgbClr val="C00000"/>
+                </a:solidFill>
+                <a:sym typeface="+mn-ea"/>
+              </a:rPr>
+              <a:t>Warm Welcome</a:t>
+            </a:r>
+            <a:r>
+              <a:rPr lang="en-US" altLang="en-US" sz="2200">
+                <a:solidFill>
+                  <a:srgbClr val="C00000"/>
+                </a:solidFill>
+                <a:sym typeface="+mn-ea"/>
+              </a:rPr>
+              <a:t> and </a:t>
+            </a:r>
+            <a:r>
+              <a:rPr lang="en-US" altLang="en-US" sz="2200" b="1">
+                <a:solidFill>
+                  <a:srgbClr val="C00000"/>
+                </a:solidFill>
+                <a:sym typeface="+mn-ea"/>
+              </a:rPr>
+              <a:t>Farewell</a:t>
+            </a:r>
+            <a:r>
+              <a:rPr lang="en-US" altLang="en-US" sz="2200">
+                <a:solidFill>
+                  <a:srgbClr val="C00000"/>
+                </a:solidFill>
+                <a:sym typeface="+mn-ea"/>
+              </a:rPr>
+              <a:t>: Ensure genuine greetings during boarding and appreciative farewells during disembarking. Using passenger names (where feasible and appropriate) can add a personal touch.</a:t>
+            </a:r>
+            <a:endParaRPr lang="vi-VN" altLang="en-US" sz="2200">
+              <a:solidFill>
+                <a:srgbClr val="C00000"/>
+              </a:solidFill>
+              <a:sym typeface="+mn-ea"/>
+            </a:endParaRPr>
+          </a:p>
+          <a:p>
+            <a:pPr indent="457200">
+              <a:lnSpc>
+                <a:spcPct val="150000"/>
+              </a:lnSpc>
+            </a:pPr>
+            <a:endParaRPr lang="en-US" altLang="en-US" sz="2200">
+              <a:solidFill>
+                <a:srgbClr val="C00000"/>
+              </a:solidFill>
+              <a:sym typeface="+mn-ea"/>
+            </a:endParaRPr>
+          </a:p>
+          <a:p>
+            <a:pPr indent="457200">
+              <a:lnSpc>
+                <a:spcPct val="150000"/>
+              </a:lnSpc>
+            </a:pPr>
+            <a:r>
+              <a:rPr lang="en-US" altLang="en-US" sz="2200">
+                <a:solidFill>
+                  <a:srgbClr val="C00000"/>
+                </a:solidFill>
+                <a:sym typeface="+mn-ea"/>
+              </a:rPr>
+              <a:t>Streamlined Service Flows: </a:t>
+            </a:r>
+            <a:r>
+              <a:rPr lang="en-US" altLang="en-US" sz="2200" b="1">
+                <a:solidFill>
+                  <a:srgbClr val="C00000"/>
+                </a:solidFill>
+                <a:sym typeface="+mn-ea"/>
+              </a:rPr>
+              <a:t>Optimize processes</a:t>
+            </a:r>
+            <a:r>
+              <a:rPr lang="en-US" altLang="en-US" sz="2200">
+                <a:solidFill>
+                  <a:srgbClr val="C00000"/>
+                </a:solidFill>
+                <a:sym typeface="+mn-ea"/>
+              </a:rPr>
+              <a:t> for meal service, drink rounds, and duty-free sales to ensure efficiency without feeling rushed.</a:t>
+            </a:r>
+            <a:endParaRPr lang="en-US" altLang="en-US" sz="2200">
+              <a:solidFill>
+                <a:srgbClr val="C00000"/>
+              </a:solidFill>
+              <a:sym typeface="+mn-ea"/>
+            </a:endParaRPr>
+          </a:p>
+          <a:p>
+            <a:pPr>
+              <a:lnSpc>
+                <a:spcPct val="150000"/>
+              </a:lnSpc>
+            </a:pPr>
+            <a:endParaRPr lang="en-US" altLang="en-US" sz="2200">
+              <a:solidFill>
+                <a:srgbClr val="C00000"/>
+              </a:solidFill>
+              <a:sym typeface="+mn-ea"/>
+            </a:endParaRPr>
+          </a:p>
+        </p:txBody>
+      </p:sp>
+      <p:pic>
+        <p:nvPicPr>
+          <p:cNvPr id="10" name="Picture 9"/>
+          <p:cNvPicPr/>
+          <p:nvPr/>
+        </p:nvPicPr>
+        <p:blipFill>
+          <a:blip r:embed="rId2">
+            <a:alphaModFix amt="20000"/>
+          </a:blip>
+          <a:stretch>
+            <a:fillRect/>
+          </a:stretch>
+        </p:blipFill>
+        <p:spPr>
+          <a:xfrm>
+            <a:off x="9602470" y="149225"/>
+            <a:ext cx="2297430" cy="2250440"/>
+          </a:xfrm>
+          <a:prstGeom prst="rect">
+            <a:avLst/>
+          </a:prstGeom>
+          <a:effectLst>
+            <a:softEdge rad="254000"/>
+          </a:effectLst>
+        </p:spPr>
+      </p:pic>
+      <p:sp>
+        <p:nvSpPr>
+          <p:cNvPr id="11" name="Text Box 10"/>
+          <p:cNvSpPr txBox="1"/>
+          <p:nvPr/>
+        </p:nvSpPr>
+        <p:spPr>
+          <a:xfrm>
+            <a:off x="127000" y="1217295"/>
+            <a:ext cx="9359900" cy="1182370"/>
+          </a:xfrm>
+          <a:prstGeom prst="rect">
+            <a:avLst/>
+          </a:prstGeom>
+          <a:noFill/>
+        </p:spPr>
+        <p:txBody>
+          <a:bodyPr wrap="square" rtlCol="0">
+            <a:noAutofit/>
+          </a:bodyPr>
+          <a:p>
+            <a:r>
+              <a:rPr lang="en-US" sz="2000">
+                <a:solidFill>
+                  <a:schemeClr val="accent2">
+                    <a:lumMod val="50000"/>
+                  </a:schemeClr>
+                </a:solidFill>
+              </a:rPr>
+              <a:t>Airlines should prioritize improvements </a:t>
+            </a:r>
+            <a:r>
+              <a:rPr lang="en-US" sz="2000" b="1" i="1">
+                <a:solidFill>
+                  <a:schemeClr val="accent2">
+                    <a:lumMod val="50000"/>
+                  </a:schemeClr>
+                </a:solidFill>
+              </a:rPr>
+              <a:t>inflight entertainment</a:t>
+            </a:r>
+            <a:r>
+              <a:rPr lang="en-US" sz="2000">
+                <a:solidFill>
+                  <a:schemeClr val="accent2">
+                    <a:lumMod val="50000"/>
+                  </a:schemeClr>
+                </a:solidFill>
+              </a:rPr>
+              <a:t>, </a:t>
+            </a:r>
+            <a:endParaRPr lang="en-US" sz="2000">
+              <a:solidFill>
+                <a:schemeClr val="accent2">
+                  <a:lumMod val="50000"/>
+                </a:schemeClr>
+              </a:solidFill>
+            </a:endParaRPr>
+          </a:p>
+          <a:p>
+            <a:r>
+              <a:rPr lang="en-US" sz="2000" b="1" i="1">
+                <a:solidFill>
+                  <a:schemeClr val="accent2">
+                    <a:lumMod val="50000"/>
+                  </a:schemeClr>
+                </a:solidFill>
+              </a:rPr>
+              <a:t>on-board service</a:t>
+            </a:r>
+            <a:r>
+              <a:rPr lang="en-US" sz="2000">
+                <a:solidFill>
+                  <a:schemeClr val="accent2">
+                    <a:lumMod val="50000"/>
+                  </a:schemeClr>
+                </a:solidFill>
+              </a:rPr>
+              <a:t>, and </a:t>
+            </a:r>
+            <a:r>
+              <a:rPr lang="en-US" sz="2000" b="1" i="1">
+                <a:solidFill>
+                  <a:schemeClr val="accent2">
+                    <a:lumMod val="50000"/>
+                  </a:schemeClr>
+                </a:solidFill>
+              </a:rPr>
+              <a:t>seat co</a:t>
+            </a:r>
+            <a:r>
+              <a:rPr lang="vi-VN" altLang="en-US" sz="2000" b="1" i="1">
+                <a:solidFill>
+                  <a:schemeClr val="accent2">
+                    <a:lumMod val="50000"/>
+                  </a:schemeClr>
+                </a:solidFill>
+              </a:rPr>
+              <a:t>m</a:t>
+            </a:r>
+            <a:r>
+              <a:rPr lang="en-US" sz="2000" b="1" i="1">
+                <a:solidFill>
+                  <a:schemeClr val="accent2">
+                    <a:lumMod val="50000"/>
+                  </a:schemeClr>
+                </a:solidFill>
+              </a:rPr>
+              <a:t>fort</a:t>
+            </a:r>
+            <a:r>
+              <a:rPr lang="en-US" sz="2000">
+                <a:solidFill>
+                  <a:schemeClr val="accent2">
+                    <a:lumMod val="50000"/>
+                  </a:schemeClr>
+                </a:solidFill>
+              </a:rPr>
+              <a:t> to enhance customer satisfaction and reduce dissatisfaction</a:t>
+            </a:r>
+            <a:endParaRPr lang="en-US" sz="2000">
+              <a:solidFill>
+                <a:schemeClr val="accent2">
+                  <a:lumMod val="50000"/>
+                </a:schemeClr>
+              </a:solidFill>
+            </a:endParaRPr>
+          </a:p>
+        </p:txBody>
+      </p:sp>
+    </p:spTree>
+  </p:cSld>
+  <p:clrMapOvr>
+    <a:masterClrMapping/>
+  </p:clrMapOvr>
+</p:sld>
+</file>
+
+<file path=ppt/slides/slide17.xml><?xml version="1.0" encoding="utf-8"?>
+<p:sld xmlns:a="http://schemas.openxmlformats.org/drawingml/2006/main" xmlns:r="http://schemas.openxmlformats.org/officeDocument/2006/relationships" xmlns:p="http://schemas.openxmlformats.org/presentationml/2006/main">
+  <p:cSld>
+    <p:bg>
+      <p:bgPr>
+        <a:gradFill>
+          <a:gsLst>
+            <a:gs pos="0">
+              <a:srgbClr val="FEF8E0">
+                <a:lumMod val="70000"/>
+                <a:lumOff val="30000"/>
+              </a:srgbClr>
+            </a:gs>
+            <a:gs pos="100000">
+              <a:srgbClr val="F9D791">
+                <a:lumMod val="65000"/>
+              </a:srgbClr>
+            </a:gs>
+          </a:gsLst>
+          <a:lin ang="18900000" scaled="0"/>
+        </a:gradFill>
+        <a:effectLst/>
+      </p:bgPr>
+    </p:bg>
+    <p:spTree>
+      <p:nvGrpSpPr>
+        <p:cNvPr id="1" name=""/>
+        <p:cNvGrpSpPr/>
+        <p:nvPr/>
+      </p:nvGrpSpPr>
+      <p:grpSpPr/>
+      <p:pic>
+        <p:nvPicPr>
+          <p:cNvPr id="12" name="Picture 11"/>
+          <p:cNvPicPr/>
+          <p:nvPr/>
+        </p:nvPicPr>
+        <p:blipFill>
+          <a:blip r:embed="rId1">
+            <a:alphaModFix amt="10000"/>
+          </a:blip>
+          <a:stretch>
+            <a:fillRect/>
+          </a:stretch>
+        </p:blipFill>
+        <p:spPr>
+          <a:xfrm>
+            <a:off x="0" y="0"/>
+            <a:ext cx="12192000" cy="6858000"/>
+          </a:xfrm>
+          <a:prstGeom prst="rect">
+            <a:avLst/>
+          </a:prstGeom>
+          <a:noFill/>
+          <a:effectLst>
+            <a:glow>
+              <a:schemeClr val="accent1">
+                <a:alpha val="0"/>
+              </a:schemeClr>
+            </a:glow>
+            <a:outerShdw blurRad="50800" dist="50800" dir="5400000" algn="ctr" rotWithShape="0">
+              <a:srgbClr val="000000">
+                <a:alpha val="55000"/>
+              </a:srgbClr>
+            </a:outerShdw>
+            <a:softEdge rad="635000"/>
+          </a:effectLst>
+        </p:spPr>
+      </p:pic>
+      <p:pic>
+        <p:nvPicPr>
+          <p:cNvPr id="4" name="Picture 3"/>
+          <p:cNvPicPr/>
+          <p:nvPr/>
+        </p:nvPicPr>
+        <p:blipFill>
+          <a:blip r:embed="rId2">
+            <a:alphaModFix amt="20000"/>
+          </a:blip>
+          <a:stretch>
+            <a:fillRect/>
+          </a:stretch>
+        </p:blipFill>
+        <p:spPr>
+          <a:xfrm>
+            <a:off x="8662670" y="149225"/>
+            <a:ext cx="3237230" cy="2985770"/>
+          </a:xfrm>
+          <a:prstGeom prst="rect">
+            <a:avLst/>
+          </a:prstGeom>
+          <a:effectLst>
+            <a:softEdge rad="254000"/>
+          </a:effectLst>
+        </p:spPr>
+      </p:pic>
+      <p:sp>
+        <p:nvSpPr>
+          <p:cNvPr id="5" name="Text Box 4"/>
+          <p:cNvSpPr txBox="1"/>
+          <p:nvPr/>
+        </p:nvSpPr>
+        <p:spPr>
+          <a:xfrm>
+            <a:off x="127000" y="149225"/>
+            <a:ext cx="9359900" cy="629920"/>
+          </a:xfrm>
+          <a:prstGeom prst="rect">
+            <a:avLst/>
+          </a:prstGeom>
+        </p:spPr>
+        <p:txBody>
+          <a:bodyPr wrap="square">
+            <a:spAutoFit/>
+          </a:bodyPr>
+          <a:p>
+            <a:pPr marL="0" indent="0"/>
+            <a:r>
+              <a:rPr sz="3500" b="1" i="0">
+                <a:solidFill>
+                  <a:srgbClr val="002060"/>
+                </a:solidFill>
+                <a:latin typeface="Poppins"/>
+                <a:ea typeface="Poppins"/>
+              </a:rPr>
+              <a:t>Enhancing Airline Customer Experience</a:t>
+            </a:r>
+            <a:endParaRPr sz="3500" b="1" i="0">
+              <a:solidFill>
+                <a:srgbClr val="002060"/>
+              </a:solidFill>
+              <a:latin typeface="Poppins"/>
+              <a:ea typeface="Poppins"/>
+            </a:endParaRPr>
+          </a:p>
+        </p:txBody>
+      </p:sp>
+      <p:sp>
+        <p:nvSpPr>
+          <p:cNvPr id="6" name="Text Box 5"/>
+          <p:cNvSpPr txBox="1"/>
+          <p:nvPr/>
+        </p:nvSpPr>
+        <p:spPr>
+          <a:xfrm>
+            <a:off x="127000" y="778828"/>
+            <a:ext cx="5080000" cy="398780"/>
+          </a:xfrm>
+          <a:prstGeom prst="rect">
+            <a:avLst/>
+          </a:prstGeom>
+        </p:spPr>
+        <p:txBody>
+          <a:bodyPr>
+            <a:spAutoFit/>
+          </a:bodyPr>
+          <a:p>
+            <a:pPr marL="0" indent="0">
+              <a:spcBef>
+                <a:spcPct val="0"/>
+              </a:spcBef>
+              <a:spcAft>
+                <a:spcPct val="0"/>
+              </a:spcAft>
+              <a:buFont typeface="Arial" panose="020B0604020202090204"/>
+              <a:buNone/>
+            </a:pPr>
+            <a:r>
+              <a:rPr lang="en-US" sz="2000" b="0" i="0">
+                <a:solidFill>
+                  <a:schemeClr val="tx1"/>
+                </a:solidFill>
+                <a:latin typeface="Roboto"/>
+                <a:ea typeface="Roboto"/>
+              </a:rPr>
+              <a:t>K</a:t>
+            </a:r>
+            <a:r>
+              <a:rPr sz="2000" b="0" i="0">
+                <a:solidFill>
+                  <a:schemeClr val="tx1"/>
+                </a:solidFill>
+                <a:latin typeface="Roboto"/>
+                <a:ea typeface="Roboto"/>
+              </a:rPr>
+              <a:t>ey Strategies to Boost Satisfaction</a:t>
+            </a:r>
+            <a:endParaRPr sz="2000" b="0" i="0">
+              <a:solidFill>
+                <a:schemeClr val="tx1"/>
+              </a:solidFill>
+              <a:latin typeface="Roboto"/>
+              <a:ea typeface="Roboto"/>
+            </a:endParaRPr>
+          </a:p>
+        </p:txBody>
+      </p:sp>
+      <p:sp>
+        <p:nvSpPr>
+          <p:cNvPr id="9" name="Text Box 8"/>
+          <p:cNvSpPr txBox="1"/>
+          <p:nvPr/>
+        </p:nvSpPr>
+        <p:spPr>
+          <a:xfrm>
+            <a:off x="420624" y="2313432"/>
+            <a:ext cx="9770745" cy="3664585"/>
+          </a:xfrm>
+          <a:prstGeom prst="rect">
+            <a:avLst/>
+          </a:prstGeom>
+          <a:noFill/>
+        </p:spPr>
+        <p:txBody>
+          <a:bodyPr wrap="square" rtlCol="0" anchor="t">
+            <a:noAutofit/>
+          </a:bodyPr>
+          <a:p>
+            <a:r>
+              <a:rPr lang="vi-VN" altLang="en-US" sz="2200" b="1">
+                <a:solidFill>
+                  <a:srgbClr val="C00000"/>
+                </a:solidFill>
+                <a:sym typeface="+mn-ea"/>
+              </a:rPr>
+              <a:t>◆ Seat com</a:t>
+            </a:r>
+            <a:r>
+              <a:rPr lang="vi-VN" altLang="en-US" sz="2200" b="1">
+                <a:solidFill>
+                  <a:srgbClr val="C00000"/>
+                </a:solidFill>
+                <a:sym typeface="+mn-ea"/>
+              </a:rPr>
+              <a:t>fort:</a:t>
+            </a:r>
+            <a:endParaRPr lang="vi-VN" altLang="en-US" sz="2200" b="1">
+              <a:solidFill>
+                <a:srgbClr val="C00000"/>
+              </a:solidFill>
+              <a:sym typeface="+mn-ea"/>
+            </a:endParaRPr>
+          </a:p>
+          <a:p>
+            <a:pPr indent="457200">
+              <a:lnSpc>
+                <a:spcPct val="150000"/>
+              </a:lnSpc>
+            </a:pPr>
+            <a:r>
+              <a:rPr lang="en-US" altLang="en-US" sz="2200">
+                <a:solidFill>
+                  <a:srgbClr val="C00000"/>
+                </a:solidFill>
+                <a:sym typeface="+mn-ea"/>
+              </a:rPr>
+              <a:t>Personal Charging Ports: Provide </a:t>
+            </a:r>
+            <a:r>
+              <a:rPr lang="en-US" altLang="en-US" sz="2200" b="1">
+                <a:solidFill>
+                  <a:srgbClr val="C00000"/>
+                </a:solidFill>
+                <a:sym typeface="+mn-ea"/>
+              </a:rPr>
+              <a:t>USB charging ports</a:t>
+            </a:r>
+            <a:r>
+              <a:rPr lang="en-US" altLang="en-US" sz="2200">
+                <a:solidFill>
+                  <a:srgbClr val="C00000"/>
+                </a:solidFill>
+                <a:sym typeface="+mn-ea"/>
+              </a:rPr>
+              <a:t> or power outlets at </a:t>
+            </a:r>
+            <a:r>
+              <a:rPr lang="en-US" altLang="en-US" sz="2200" b="1">
+                <a:solidFill>
+                  <a:srgbClr val="C00000"/>
+                </a:solidFill>
+                <a:sym typeface="+mn-ea"/>
+              </a:rPr>
+              <a:t>each seat</a:t>
+            </a:r>
+            <a:r>
+              <a:rPr lang="en-US" altLang="en-US" sz="2200">
+                <a:solidFill>
+                  <a:srgbClr val="C00000"/>
+                </a:solidFill>
+                <a:sym typeface="+mn-ea"/>
+              </a:rPr>
+              <a:t> for passengers to charge their personal devices.</a:t>
+            </a:r>
+            <a:endParaRPr lang="en-US" altLang="en-US" sz="2200">
+              <a:solidFill>
+                <a:srgbClr val="C00000"/>
+              </a:solidFill>
+              <a:sym typeface="+mn-ea"/>
+            </a:endParaRPr>
+          </a:p>
+          <a:p>
+            <a:pPr>
+              <a:lnSpc>
+                <a:spcPct val="150000"/>
+              </a:lnSpc>
+            </a:pPr>
+            <a:endParaRPr lang="en-US" altLang="en-US" sz="2200">
+              <a:solidFill>
+                <a:srgbClr val="C00000"/>
+              </a:solidFill>
+              <a:sym typeface="+mn-ea"/>
+            </a:endParaRPr>
+          </a:p>
+          <a:p>
+            <a:pPr indent="457200">
+              <a:lnSpc>
+                <a:spcPct val="150000"/>
+              </a:lnSpc>
+            </a:pPr>
+            <a:r>
+              <a:rPr lang="en-US" altLang="en-US" sz="2200">
+                <a:solidFill>
+                  <a:srgbClr val="C00000"/>
+                </a:solidFill>
+                <a:sym typeface="+mn-ea"/>
+              </a:rPr>
+              <a:t>Improved Cushioning: Invest in higher-quality seat foam and padding that retains its shape and support over time, excessive firmness.</a:t>
+            </a:r>
+            <a:endParaRPr lang="en-US" altLang="en-US" sz="2200">
+              <a:solidFill>
+                <a:srgbClr val="C00000"/>
+              </a:solidFill>
+              <a:sym typeface="+mn-ea"/>
+            </a:endParaRPr>
+          </a:p>
+          <a:p>
+            <a:pPr>
+              <a:lnSpc>
+                <a:spcPct val="150000"/>
+              </a:lnSpc>
+            </a:pPr>
+            <a:endParaRPr lang="en-US" altLang="en-US" sz="2200">
+              <a:solidFill>
+                <a:srgbClr val="C00000"/>
+              </a:solidFill>
+              <a:sym typeface="+mn-ea"/>
+            </a:endParaRPr>
+          </a:p>
+          <a:p>
+            <a:pPr>
+              <a:lnSpc>
+                <a:spcPct val="150000"/>
+              </a:lnSpc>
+            </a:pPr>
+            <a:endParaRPr lang="en-US" altLang="en-US" sz="2200">
+              <a:solidFill>
+                <a:srgbClr val="C00000"/>
+              </a:solidFill>
+              <a:sym typeface="+mn-ea"/>
+            </a:endParaRPr>
+          </a:p>
+        </p:txBody>
+      </p:sp>
+      <p:sp>
+        <p:nvSpPr>
+          <p:cNvPr id="8" name="Text Box 7"/>
+          <p:cNvSpPr txBox="1"/>
+          <p:nvPr/>
+        </p:nvSpPr>
+        <p:spPr>
+          <a:xfrm>
+            <a:off x="127000" y="1217295"/>
+            <a:ext cx="9359900" cy="1182370"/>
+          </a:xfrm>
+          <a:prstGeom prst="rect">
+            <a:avLst/>
+          </a:prstGeom>
+          <a:noFill/>
+        </p:spPr>
+        <p:txBody>
+          <a:bodyPr wrap="square" rtlCol="0">
+            <a:noAutofit/>
+          </a:bodyPr>
+          <a:p>
+            <a:r>
+              <a:rPr lang="en-US" sz="2000">
+                <a:solidFill>
+                  <a:schemeClr val="accent2">
+                    <a:lumMod val="50000"/>
+                  </a:schemeClr>
+                </a:solidFill>
+              </a:rPr>
+              <a:t>Airlines should prioritize improvements </a:t>
+            </a:r>
+            <a:r>
+              <a:rPr lang="en-US" sz="2000" b="1" i="1">
+                <a:solidFill>
+                  <a:schemeClr val="accent2">
+                    <a:lumMod val="50000"/>
+                  </a:schemeClr>
+                </a:solidFill>
+              </a:rPr>
+              <a:t>inflight entertainment</a:t>
+            </a:r>
+            <a:r>
+              <a:rPr lang="en-US" sz="2000">
+                <a:solidFill>
+                  <a:schemeClr val="accent2">
+                    <a:lumMod val="50000"/>
+                  </a:schemeClr>
+                </a:solidFill>
+              </a:rPr>
+              <a:t>, </a:t>
+            </a:r>
+            <a:endParaRPr lang="en-US" sz="2000">
+              <a:solidFill>
+                <a:schemeClr val="accent2">
+                  <a:lumMod val="50000"/>
+                </a:schemeClr>
+              </a:solidFill>
+            </a:endParaRPr>
+          </a:p>
+          <a:p>
+            <a:r>
+              <a:rPr lang="en-US" sz="2000" b="1" i="1">
+                <a:solidFill>
+                  <a:schemeClr val="accent2">
+                    <a:lumMod val="50000"/>
+                  </a:schemeClr>
+                </a:solidFill>
+              </a:rPr>
+              <a:t>on-board service</a:t>
+            </a:r>
+            <a:r>
+              <a:rPr lang="en-US" sz="2000">
+                <a:solidFill>
+                  <a:schemeClr val="accent2">
+                    <a:lumMod val="50000"/>
+                  </a:schemeClr>
+                </a:solidFill>
+              </a:rPr>
+              <a:t>, and </a:t>
+            </a:r>
+            <a:r>
+              <a:rPr lang="en-US" sz="2000" b="1" i="1">
+                <a:solidFill>
+                  <a:schemeClr val="accent2">
+                    <a:lumMod val="50000"/>
+                  </a:schemeClr>
+                </a:solidFill>
+              </a:rPr>
+              <a:t>seat co</a:t>
+            </a:r>
+            <a:r>
+              <a:rPr lang="vi-VN" altLang="en-US" sz="2000" b="1" i="1">
+                <a:solidFill>
+                  <a:schemeClr val="accent2">
+                    <a:lumMod val="50000"/>
+                  </a:schemeClr>
+                </a:solidFill>
+              </a:rPr>
+              <a:t>m</a:t>
+            </a:r>
+            <a:r>
+              <a:rPr lang="en-US" sz="2000" b="1" i="1">
+                <a:solidFill>
+                  <a:schemeClr val="accent2">
+                    <a:lumMod val="50000"/>
+                  </a:schemeClr>
+                </a:solidFill>
+              </a:rPr>
+              <a:t>fort</a:t>
+            </a:r>
+            <a:r>
+              <a:rPr lang="en-US" sz="2000">
+                <a:solidFill>
+                  <a:schemeClr val="accent2">
+                    <a:lumMod val="50000"/>
+                  </a:schemeClr>
+                </a:solidFill>
+              </a:rPr>
+              <a:t> to enhance customer satisfaction and reduce dissatisfaction</a:t>
+            </a:r>
+            <a:endParaRPr lang="en-US" sz="2000">
+              <a:solidFill>
+                <a:schemeClr val="accent2">
+                  <a:lumMod val="50000"/>
+                </a:schemeClr>
+              </a:solidFill>
+            </a:endParaRPr>
+          </a:p>
+        </p:txBody>
+      </p:sp>
+    </p:spTree>
+  </p:cSld>
+  <p:clrMapOvr>
+    <a:masterClrMapping/>
+  </p:clrMapOvr>
+</p:sld>
+</file>
+
+<file path=ppt/slides/slide18.xml><?xml version="1.0" encoding="utf-8"?>
+<p:sld xmlns:a="http://schemas.openxmlformats.org/drawingml/2006/main" xmlns:r="http://schemas.openxmlformats.org/officeDocument/2006/relationships" xmlns:p="http://schemas.openxmlformats.org/presentationml/2006/main">
+  <p:cSld>
+    <p:bg>
+      <p:bgPr>
+        <a:gradFill flip="none">
+          <a:gsLst>
+            <a:gs pos="0">
+              <a:srgbClr val="FCEBA4"/>
+            </a:gs>
+            <a:gs pos="100000">
+              <a:srgbClr val="F9D791">
+                <a:lumMod val="65000"/>
+              </a:srgbClr>
+            </a:gs>
+          </a:gsLst>
+          <a:lin ang="2700000" scaled="0"/>
+        </a:gradFill>
+        <a:effectLst/>
+      </p:bgPr>
+    </p:bg>
+    <p:spTree>
+      <p:nvGrpSpPr>
+        <p:cNvPr id="1" name=""/>
+        <p:cNvGrpSpPr/>
+        <p:nvPr/>
+      </p:nvGrpSpPr>
+      <p:grpSpPr/>
       <p:pic>
         <p:nvPicPr>
           <p:cNvPr id="8" name="Picture 7"/>
@@ -5891,7 +7333,7 @@
           <p:nvPr/>
         </p:nvPicPr>
         <p:blipFill>
-          <a:blip r:embed="rId3">
+          <a:blip r:embed="rId1">
             <a:alphaModFix amt="90000"/>
           </a:blip>
           <a:srcRect t="18825" r="100" b="10975"/>
@@ -5901,7 +7343,7 @@
         </p:blipFill>
         <p:spPr>
           <a:xfrm>
-            <a:off x="1054100" y="3686175"/>
+            <a:off x="1120140" y="2647950"/>
             <a:ext cx="10391140" cy="2821305"/>
           </a:xfrm>
           <a:prstGeom prst="rect">
@@ -5915,6 +7357,66 @@
             </a:glow>
             <a:softEdge rad="279400"/>
           </a:effectLst>
+        </p:spPr>
+      </p:pic>
+      <p:pic>
+        <p:nvPicPr>
+          <p:cNvPr id="12" name="Picture 11"/>
+          <p:cNvPicPr/>
+          <p:nvPr/>
+        </p:nvPicPr>
+        <p:blipFill>
+          <a:blip r:embed="rId2">
+            <a:alphaModFix amt="10000"/>
+          </a:blip>
+          <a:stretch>
+            <a:fillRect/>
+          </a:stretch>
+        </p:blipFill>
+        <p:spPr>
+          <a:xfrm>
+            <a:off x="0" y="0"/>
+            <a:ext cx="12192000" cy="6858000"/>
+          </a:xfrm>
+          <a:prstGeom prst="rect">
+            <a:avLst/>
+          </a:prstGeom>
+          <a:noFill/>
+          <a:effectLst>
+            <a:glow>
+              <a:schemeClr val="accent1">
+                <a:alpha val="0"/>
+              </a:schemeClr>
+            </a:glow>
+            <a:outerShdw blurRad="50800" dist="50800" dir="5400000" algn="ctr" rotWithShape="0">
+              <a:srgbClr val="000000">
+                <a:alpha val="55000"/>
+              </a:srgbClr>
+            </a:outerShdw>
+            <a:softEdge rad="635000"/>
+          </a:effectLst>
+        </p:spPr>
+      </p:pic>
+      <p:pic>
+        <p:nvPicPr>
+          <p:cNvPr id="5" name="Picture 4"/>
+          <p:cNvPicPr/>
+          <p:nvPr/>
+        </p:nvPicPr>
+        <p:blipFill>
+          <a:blip r:embed="rId3"/>
+          <a:stretch>
+            <a:fillRect/>
+          </a:stretch>
+        </p:blipFill>
+        <p:spPr>
+          <a:xfrm>
+            <a:off x="284480" y="238443"/>
+            <a:ext cx="2857500" cy="866775"/>
+          </a:xfrm>
+          <a:prstGeom prst="rect">
+            <a:avLst/>
+          </a:prstGeom>
         </p:spPr>
       </p:pic>
     </p:spTree>
@@ -8422,7 +9924,27 @@
                 <a:latin typeface="Roboto"/>
                 <a:ea typeface="Roboto"/>
               </a:rPr>
-              <a:t>, indicating strong brand attachment.</a:t>
+              <a:t>, indicating </a:t>
+            </a:r>
+            <a:r>
+              <a:rPr lang="vi-VN" altLang="en-US" sz="1600" b="1" i="0">
+                <a:solidFill>
+                  <a:schemeClr val="tx1"/>
+                </a:solidFill>
+                <a:latin typeface="Roboto"/>
+                <a:ea typeface="Roboto"/>
+              </a:rPr>
+              <a:t>a weak </a:t>
+            </a:r>
+            <a:r>
+              <a:rPr lang="en-US" altLang="en-US" sz="1600" b="1" i="0">
+                <a:solidFill>
+                  <a:schemeClr val="tx1"/>
+                </a:solidFill>
+                <a:latin typeface="Roboto"/>
+                <a:ea typeface="Roboto"/>
+              </a:rPr>
+              <a:t>brand attachment.</a:t>
             </a:r>
             <a:endParaRPr lang="en-US" altLang="en-US" sz="1600" b="1" i="0">
               <a:solidFill>

</xml_diff>